<commit_message>
made lecture and practical more better
</commit_message>
<xml_diff>
--- a/slides/how_to_write_a_script_final.pptx
+++ b/slides/how_to_write_a_script_final.pptx
@@ -2,27 +2,28 @@
 <file path=ppt/presentation.xml><?xml version="1.0" encoding="utf-8"?>
 <p:presentation xmlns:a="http://schemas.openxmlformats.org/drawingml/2006/main" xmlns:r="http://schemas.openxmlformats.org/officeDocument/2006/relationships" xmlns:p="http://schemas.openxmlformats.org/presentationml/2006/main" saveSubsetFonts="1" autoCompressPictures="0">
   <p:sldMasterIdLst>
-    <p:sldMasterId id="2147483660" r:id="rId1"/>
+    <p:sldMasterId id="2147483660" r:id="rId4"/>
   </p:sldMasterIdLst>
   <p:sldIdLst>
-    <p:sldId id="256" r:id="rId2"/>
-    <p:sldId id="257" r:id="rId3"/>
-    <p:sldId id="258" r:id="rId4"/>
-    <p:sldId id="259" r:id="rId5"/>
-    <p:sldId id="260" r:id="rId6"/>
-    <p:sldId id="261" r:id="rId7"/>
-    <p:sldId id="262" r:id="rId8"/>
-    <p:sldId id="263" r:id="rId9"/>
-    <p:sldId id="264" r:id="rId10"/>
-    <p:sldId id="265" r:id="rId11"/>
-    <p:sldId id="266" r:id="rId12"/>
-    <p:sldId id="268" r:id="rId13"/>
-    <p:sldId id="269" r:id="rId14"/>
-    <p:sldId id="270" r:id="rId15"/>
-    <p:sldId id="271" r:id="rId16"/>
-    <p:sldId id="272" r:id="rId17"/>
-    <p:sldId id="273" r:id="rId18"/>
-    <p:sldId id="274" r:id="rId19"/>
+    <p:sldId id="256" r:id="rId5"/>
+    <p:sldId id="257" r:id="rId6"/>
+    <p:sldId id="258" r:id="rId7"/>
+    <p:sldId id="259" r:id="rId8"/>
+    <p:sldId id="260" r:id="rId9"/>
+    <p:sldId id="261" r:id="rId10"/>
+    <p:sldId id="262" r:id="rId11"/>
+    <p:sldId id="263" r:id="rId12"/>
+    <p:sldId id="264" r:id="rId13"/>
+    <p:sldId id="265" r:id="rId14"/>
+    <p:sldId id="266" r:id="rId15"/>
+    <p:sldId id="268" r:id="rId16"/>
+    <p:sldId id="269" r:id="rId17"/>
+    <p:sldId id="270" r:id="rId18"/>
+    <p:sldId id="271" r:id="rId19"/>
+    <p:sldId id="272" r:id="rId20"/>
+    <p:sldId id="273" r:id="rId21"/>
+    <p:sldId id="275" r:id="rId22"/>
+    <p:sldId id="274" r:id="rId23"/>
   </p:sldIdLst>
   <p:sldSz cx="12192000" cy="6858000"/>
   <p:notesSz cx="6858000" cy="9144000"/>
@@ -127,6 +128,14 @@
     </p:ext>
   </p:extLst>
 </p:presentation>
+</file>
+
+<file path=ppt/revisionInfo.xml><?xml version="1.0" encoding="utf-8"?>
+<p1510:revInfo xmlns:a="http://schemas.openxmlformats.org/drawingml/2006/main" xmlns:r="http://schemas.openxmlformats.org/officeDocument/2006/relationships" xmlns:p1510="http://schemas.microsoft.com/office/powerpoint/2015/10/main">
+  <p1510:revLst>
+    <p1510:client id="{04695B4B-D47D-9CC0-D5CD-254D49CE6E73}" v="92" dt="2020-10-19T17:59:35.927"/>
+  </p1510:revLst>
+</p1510:revInfo>
 </file>
 
 <file path=ppt/slideLayouts/slideLayout1.xml><?xml version="1.0" encoding="utf-8"?>
@@ -488,7 +497,7 @@
             <a:fld id="{3E2C485A-CFD1-4426-A587-FCC12D6AD237}" type="datetime1">
               <a:rPr lang="en-GB" smtClean="0"/>
               <a:pPr/>
-              <a:t>07/10/2020</a:t>
+              <a:t>29/10/2021</a:t>
             </a:fld>
             <a:endParaRPr lang="en-GB" dirty="0"/>
           </a:p>
@@ -983,7 +992,7 @@
             <a:fld id="{D904E3C7-3434-41F6-8009-C52959A159FA}" type="datetime1">
               <a:rPr lang="en-GB" smtClean="0"/>
               <a:pPr/>
-              <a:t>07/10/2020</a:t>
+              <a:t>29/10/2021</a:t>
             </a:fld>
             <a:endParaRPr lang="en-GB" dirty="0"/>
           </a:p>
@@ -1674,7 +1683,7 @@
           <a:p>
             <a:fld id="{32E1EA51-7FC3-9141-9D0C-B47C1CD1DF00}" type="datetimeFigureOut">
               <a:rPr lang="en-GB" smtClean="0"/>
-              <a:t>07/10/2020</a:t>
+              <a:t>29/10/2021</a:t>
             </a:fld>
             <a:endParaRPr lang="en-GB"/>
           </a:p>
@@ -1921,7 +1930,7 @@
             <a:fld id="{54D2579E-D2B3-420A-972D-0CF396453095}" type="datetime1">
               <a:rPr lang="en-GB" smtClean="0"/>
               <a:pPr/>
-              <a:t>07/10/2020</a:t>
+              <a:t>29/10/2021</a:t>
             </a:fld>
             <a:endParaRPr lang="en-GB" dirty="0"/>
           </a:p>
@@ -2366,8 +2375,12 @@
               <a:buNone/>
             </a:pPr>
             <a:r>
+              <a:rPr lang="en-US" dirty="0"/>
+              <a:t>A </a:t>
+            </a:r>
+            <a:r>
               <a:rPr dirty="0"/>
-              <a:t>Gwen’s and Tom’s simple guide to writing a script</a:t>
+              <a:t>simple guide to writing a script</a:t>
             </a:r>
           </a:p>
         </p:txBody>
@@ -2395,17 +2408,42 @@
           </a:xfrm>
         </p:spPr>
         <p:txBody>
-          <a:bodyPr/>
+          <a:bodyPr>
+            <a:normAutofit/>
+          </a:bodyPr>
           <a:lstStyle/>
           <a:p>
             <a:pPr marL="0" lvl="0" indent="0">
               <a:buNone/>
             </a:pPr>
-            <a:br/>
-            <a:br/>
-            <a:r>
-              <a:t>Gwen Fernandes, Thomas Battram</a:t>
-            </a:r>
+            <a:br>
+              <a:rPr dirty="0"/>
+            </a:br>
+            <a:br>
+              <a:rPr dirty="0"/>
+            </a:br>
+            <a:r>
+              <a:rPr dirty="0"/>
+              <a:t>Thomas </a:t>
+            </a:r>
+            <a:r>
+              <a:rPr dirty="0" err="1"/>
+              <a:t>Battram</a:t>
+            </a:r>
+            <a:r>
+              <a:rPr lang="en-US" dirty="0"/>
+              <a:t> (he/him)</a:t>
+            </a:r>
+          </a:p>
+          <a:p>
+            <a:pPr marL="0" lvl="0" indent="0">
+              <a:buNone/>
+            </a:pPr>
+            <a:r>
+              <a:rPr lang="en-GB" dirty="0"/>
+              <a:t>Thanks to Gwen Fernandes for assistance</a:t>
+            </a:r>
+            <a:endParaRPr dirty="0"/>
           </a:p>
         </p:txBody>
       </p:sp>
@@ -2527,6 +2565,36 @@
           </a:p>
         </p:txBody>
       </p:sp>
+      <p:pic>
+        <p:nvPicPr>
+          <p:cNvPr id="4" name="Picture 4">
+            <a:extLst>
+              <a:ext uri="{FF2B5EF4-FFF2-40B4-BE49-F238E27FC236}">
+                <a16:creationId xmlns:a16="http://schemas.microsoft.com/office/drawing/2014/main" id="{A53BC720-9787-4FFB-A005-A926082BB854}"/>
+              </a:ext>
+            </a:extLst>
+          </p:cNvPr>
+          <p:cNvPicPr>
+            <a:picLocks noChangeAspect="1"/>
+          </p:cNvPicPr>
+          <p:nvPr/>
+        </p:nvPicPr>
+        <p:blipFill>
+          <a:blip r:embed="rId2"/>
+          <a:stretch>
+            <a:fillRect/>
+          </a:stretch>
+        </p:blipFill>
+        <p:spPr>
+          <a:xfrm>
+            <a:off x="2692400" y="4906992"/>
+            <a:ext cx="6807200" cy="693596"/>
+          </a:xfrm>
+          <a:prstGeom prst="rect">
+            <a:avLst/>
+          </a:prstGeom>
+        </p:spPr>
+      </p:pic>
     </p:spTree>
   </p:cSld>
   <p:clrMapOvr>
@@ -2605,91 +2673,50 @@
         </p:nvSpPr>
         <p:spPr/>
         <p:txBody>
-          <a:bodyPr>
-            <a:normAutofit lnSpcReduction="10000"/>
-          </a:bodyPr>
+          <a:bodyPr/>
           <a:lstStyle/>
           <a:p>
             <a:pPr marL="0" lvl="0" indent="0">
               <a:buNone/>
             </a:pPr>
             <a:r>
-              <a:rPr dirty="0"/>
               <a:t>Depending on what form the data is in, you have to use different functions to read in the data. Data you get may be in:</a:t>
             </a:r>
           </a:p>
           <a:p>
             <a:pPr lvl="1"/>
             <a:r>
-              <a:rPr dirty="0"/>
               <a:t>excel spreadsheets</a:t>
             </a:r>
           </a:p>
           <a:p>
             <a:pPr lvl="1"/>
             <a:r>
-              <a:rPr dirty="0"/>
-              <a:t>comma </a:t>
-            </a:r>
-            <a:r>
-              <a:rPr dirty="0" err="1"/>
-              <a:t>seperated</a:t>
-            </a:r>
-            <a:r>
-              <a:rPr dirty="0"/>
-              <a:t> value (csv) files</a:t>
+              <a:t>comma seperated value (csv) files</a:t>
             </a:r>
           </a:p>
           <a:p>
             <a:pPr lvl="1"/>
             <a:r>
-              <a:rPr dirty="0"/>
-              <a:t>text separated value (</a:t>
-            </a:r>
-            <a:r>
-              <a:rPr dirty="0" err="1"/>
-              <a:t>tsv</a:t>
-            </a:r>
-            <a:r>
-              <a:rPr dirty="0"/>
-              <a:t>) files</a:t>
+              <a:t>text separated value (tsv) files</a:t>
             </a:r>
           </a:p>
           <a:p>
             <a:pPr lvl="1"/>
             <a:r>
-              <a:rPr dirty="0" err="1"/>
-              <a:t>spss</a:t>
-            </a:r>
-            <a:r>
-              <a:rPr dirty="0"/>
-              <a:t> files</a:t>
+              <a:t>spss files</a:t>
             </a:r>
           </a:p>
           <a:p>
             <a:pPr lvl="1"/>
             <a:r>
-              <a:rPr dirty="0" err="1"/>
-              <a:t>stata</a:t>
-            </a:r>
-            <a:r>
-              <a:rPr dirty="0"/>
-              <a:t> files</a:t>
+              <a:t>stata files</a:t>
             </a:r>
           </a:p>
           <a:p>
             <a:pPr lvl="1"/>
             <a:r>
-              <a:rPr dirty="0"/>
-              <a:t>images (e.g. .</a:t>
-            </a:r>
-            <a:r>
-              <a:rPr dirty="0" err="1"/>
-              <a:t>png</a:t>
-            </a:r>
-            <a:r>
-              <a:rPr dirty="0"/>
-              <a:t> files)</a:t>
+              <a:t>images (e.g. .png files)</a:t>
             </a:r>
           </a:p>
           <a:p>
@@ -2697,14 +2724,8 @@
               <a:buNone/>
             </a:pPr>
             <a:r>
-              <a:rPr dirty="0"/>
-              <a:t>These need different functions to read them in, some of which are only available with certain packages</a:t>
-            </a:r>
-            <a:r>
-              <a:rPr lang="en-GB" dirty="0"/>
-              <a:t> – will be covered in more detail in the "managing data” session. </a:t>
-            </a:r>
-            <a:endParaRPr dirty="0"/>
+              <a:t>These need different functions to read them in, some of which are only available with certain packages.</a:t>
+            </a:r>
           </a:p>
         </p:txBody>
       </p:sp>
@@ -3039,6 +3060,7 @@
               <a:buAutoNum type="arabicPeriod"/>
             </a:pPr>
             <a:r>
+              <a:rPr dirty="0"/>
               <a:t>Use a consistent style when writing code</a:t>
             </a:r>
           </a:p>
@@ -3046,41 +3068,56 @@
             <a:pPr marL="0" lvl="0" indent="0">
               <a:buNone/>
             </a:pPr>
-            <a:endParaRPr/>
-          </a:p>
-          <a:p>
-            <a:pPr marL="0" lvl="0" indent="0">
-              <a:buNone/>
-            </a:pPr>
-            <a:endParaRPr/>
-          </a:p>
-          <a:p>
-            <a:pPr marL="0" lvl="0" indent="0">
-              <a:buNone/>
-            </a:pPr>
-            <a:endParaRPr/>
-          </a:p>
-          <a:p>
-            <a:pPr marL="0" lvl="0" indent="0">
-              <a:buNone/>
-            </a:pPr>
-            <a:endParaRPr/>
+            <a:endParaRPr dirty="0"/>
           </a:p>
           <a:p>
             <a:pPr lvl="1">
               <a:buAutoNum type="arabicPeriod" startAt="2"/>
             </a:pPr>
             <a:r>
-              <a:t>Use spaces appropriately</a:t>
-            </a:r>
+              <a:rPr dirty="0"/>
+              <a:t>Use spaces appropriatel</a:t>
+            </a:r>
+            <a:r>
+              <a:rPr lang="en-US" dirty="0"/>
+              <a:t>y</a:t>
+            </a:r>
+          </a:p>
+          <a:p>
+            <a:pPr lvl="1">
+              <a:buAutoNum type="arabicPeriod" startAt="2"/>
+            </a:pPr>
+            <a:endParaRPr lang="en-US" dirty="0"/>
+          </a:p>
+          <a:p>
+            <a:pPr lvl="1">
+              <a:buAutoNum type="arabicPeriod" startAt="2"/>
+            </a:pPr>
+            <a:endParaRPr lang="en-US" dirty="0"/>
+          </a:p>
+          <a:p>
+            <a:pPr lvl="1">
+              <a:buAutoNum type="arabicPeriod" startAt="2"/>
+            </a:pPr>
+            <a:r>
+              <a:rPr lang="en-US" dirty="0"/>
+              <a:t>Use indents appropriately</a:t>
+            </a:r>
+            <a:endParaRPr lang="en-GB" dirty="0"/>
           </a:p>
         </p:txBody>
       </p:sp>
       <p:pic>
         <p:nvPicPr>
-          <p:cNvPr id="4" name="Picture 1" descr="../slides/figures/hard-to-read-code.png"/>
+          <p:cNvPr id="7" name="Picture 6" descr="Text&#10;&#10;Description automatically generated">
+            <a:extLst>
+              <a:ext uri="{FF2B5EF4-FFF2-40B4-BE49-F238E27FC236}">
+                <a16:creationId xmlns:a16="http://schemas.microsoft.com/office/drawing/2014/main" id="{1D761A0A-F9CA-264B-9D70-FE0B19AC159F}"/>
+              </a:ext>
+            </a:extLst>
+          </p:cNvPr>
           <p:cNvPicPr>
-            <a:picLocks noGrp="1" noChangeAspect="1"/>
+            <a:picLocks noChangeAspect="1"/>
           </p:cNvPicPr>
           <p:nvPr/>
         </p:nvPicPr>
@@ -3090,20 +3127,14 @@
             <a:fillRect/>
           </a:stretch>
         </p:blipFill>
-        <p:spPr bwMode="auto">
+        <p:spPr>
           <a:xfrm>
-            <a:off x="6172200" y="1981200"/>
-            <a:ext cx="5524500" cy="3924300"/>
+            <a:off x="5908383" y="1825625"/>
+            <a:ext cx="6015012" cy="4667250"/>
           </a:xfrm>
           <a:prstGeom prst="rect">
             <a:avLst/>
           </a:prstGeom>
-          <a:noFill/>
-          <a:ln w="9525">
-            <a:noFill/>
-            <a:headEnd/>
-            <a:tailEnd/>
-          </a:ln>
         </p:spPr>
       </p:pic>
     </p:spTree>
@@ -3550,110 +3581,159 @@
         </p:nvSpPr>
         <p:spPr/>
         <p:txBody>
-          <a:bodyPr>
+          <a:bodyPr vert="horz" lIns="91440" tIns="45720" rIns="91440" bIns="45720" rtlCol="0" anchor="t">
             <a:normAutofit/>
           </a:bodyPr>
           <a:lstStyle/>
           <a:p>
-            <a:pPr lvl="1"/>
-            <a:r>
-              <a:rPr dirty="0"/>
+            <a:pPr marL="685165" lvl="1" indent="-227965"/>
+            <a:r>
+              <a:rPr sz="2650" dirty="0">
+                <a:latin typeface="Arial"/>
+                <a:cs typeface="Arial"/>
+              </a:rPr>
               <a:t>One way to share scripts with the world (or just your collaborators) is through </a:t>
             </a:r>
             <a:r>
-              <a:rPr dirty="0">
+              <a:rPr sz="2650" dirty="0">
+                <a:latin typeface="Arial"/>
+                <a:cs typeface="Arial"/>
                 <a:hlinkClick r:id="rId2"/>
               </a:rPr>
               <a:t>GitHub</a:t>
             </a:r>
             <a:r>
-              <a:rPr dirty="0"/>
+              <a:rPr sz="2650" dirty="0">
+                <a:latin typeface="Arial"/>
+                <a:cs typeface="Arial"/>
+              </a:rPr>
               <a:t>.</a:t>
             </a:r>
+            <a:endParaRPr lang="en-US" sz="2650" dirty="0">
+              <a:latin typeface="Arial"/>
+              <a:cs typeface="Arial"/>
+            </a:endParaRPr>
           </a:p>
           <a:p>
             <a:pPr marL="0" lvl="0" indent="0">
               <a:buNone/>
             </a:pPr>
-            <a:endParaRPr dirty="0"/>
-          </a:p>
-          <a:p>
-            <a:pPr lvl="1"/>
-            <a:r>
-              <a:rPr dirty="0"/>
+            <a:endParaRPr/>
+          </a:p>
+          <a:p>
+            <a:pPr marL="685165" lvl="1" indent="-227965"/>
+            <a:r>
+              <a:rPr sz="2650" dirty="0">
+                <a:latin typeface="Arial"/>
+                <a:cs typeface="Arial"/>
+              </a:rPr>
               <a:t>Slides are available here: </a:t>
             </a:r>
             <a:r>
-              <a:rPr dirty="0">
+              <a:rPr sz="2650" dirty="0">
+                <a:latin typeface="Arial"/>
+                <a:cs typeface="Arial"/>
                 <a:hlinkClick r:id="rId3"/>
               </a:rPr>
               <a:t>https://github.com/thomasbattram/how_to_write_a_script</a:t>
             </a:r>
-            <a:endParaRPr lang="en-GB" dirty="0">
-              <a:hlinkClick r:id="rId3"/>
+          </a:p>
+          <a:p>
+            <a:pPr marL="457200" lvl="1" indent="0">
+              <a:buNone/>
+            </a:pPr>
+            <a:endParaRPr lang="en-US" sz="2650" dirty="0">
+              <a:latin typeface="Arial"/>
+              <a:cs typeface="Arial"/>
             </a:endParaRPr>
           </a:p>
           <a:p>
-            <a:pPr marL="457189" lvl="1" indent="0">
-              <a:buNone/>
-            </a:pPr>
-            <a:endParaRPr lang="en-GB" dirty="0"/>
-          </a:p>
-          <a:p>
-            <a:pPr lvl="1"/>
-            <a:r>
-              <a:rPr lang="en-GB" dirty="0"/>
-              <a:t>For the curious: </a:t>
-            </a:r>
-          </a:p>
-          <a:p>
-            <a:pPr lvl="2"/>
-            <a:r>
-              <a:rPr lang="en-GB" dirty="0"/>
+            <a:pPr marL="914400" lvl="1" indent="-457200"/>
+            <a:r>
+              <a:rPr lang="en-US" sz="2650" dirty="0">
+                <a:latin typeface="Arial"/>
+                <a:cs typeface="Arial"/>
+              </a:rPr>
+              <a:t>For the curious:</a:t>
+            </a:r>
+            <a:endParaRPr lang="en-US" sz="2650" dirty="0"/>
+          </a:p>
+          <a:p>
+            <a:pPr marL="1142365" lvl="2" indent="-227965"/>
+            <a:r>
+              <a:rPr lang="en-US" sz="2650" dirty="0">
+                <a:latin typeface="Arial"/>
+                <a:cs typeface="Arial"/>
+              </a:rPr>
               <a:t>Rationale for </a:t>
             </a:r>
             <a:r>
-              <a:rPr lang="en-GB" dirty="0" err="1"/>
+              <a:rPr lang="en-US" sz="2650" dirty="0" err="1">
+                <a:latin typeface="Arial"/>
+                <a:cs typeface="Arial"/>
+              </a:rPr>
               <a:t>github</a:t>
             </a:r>
             <a:r>
-              <a:rPr lang="en-GB" dirty="0"/>
-              <a:t>: </a:t>
-            </a:r>
-            <a:r>
-              <a:rPr lang="en-GB" dirty="0">
+              <a:rPr lang="en-US" sz="2650" dirty="0">
+                <a:latin typeface="Arial"/>
+                <a:cs typeface="Arial"/>
+              </a:rPr>
+              <a:t>: </a:t>
+            </a:r>
+            <a:r>
+              <a:rPr lang="en-US" sz="2650" dirty="0">
+                <a:latin typeface="Arial"/>
+                <a:cs typeface="Arial"/>
                 <a:hlinkClick r:id="rId4"/>
               </a:rPr>
               <a:t>https://guides.github.com/introduction/git-handbook/</a:t>
             </a:r>
             <a:r>
-              <a:rPr lang="en-GB" dirty="0"/>
-              <a:t> </a:t>
-            </a:r>
-          </a:p>
-          <a:p>
-            <a:pPr lvl="2"/>
-            <a:r>
-              <a:rPr lang="en-GB" dirty="0" err="1"/>
+              <a:rPr lang="en-US" sz="2650" dirty="0">
+                <a:latin typeface="Arial"/>
+                <a:cs typeface="Arial"/>
+              </a:rPr>
+              <a:t> </a:t>
+            </a:r>
+            <a:endParaRPr lang="en-US" sz="2650"/>
+          </a:p>
+          <a:p>
+            <a:pPr marL="1142365" lvl="2" indent="-227965"/>
+            <a:r>
+              <a:rPr lang="en-US" sz="2650" dirty="0" err="1">
+                <a:latin typeface="Arial"/>
+                <a:cs typeface="Arial"/>
+              </a:rPr>
               <a:t>Quickstart</a:t>
             </a:r>
             <a:r>
-              <a:rPr lang="en-GB" dirty="0"/>
+              <a:rPr lang="en-US" sz="2650" dirty="0">
+                <a:latin typeface="Arial"/>
+                <a:cs typeface="Arial"/>
+              </a:rPr>
               <a:t> guide: </a:t>
             </a:r>
             <a:r>
-              <a:rPr lang="en-GB" dirty="0">
+              <a:rPr lang="en-US" sz="2650" dirty="0">
+                <a:latin typeface="Arial"/>
+                <a:cs typeface="Arial"/>
                 <a:hlinkClick r:id="rId5"/>
               </a:rPr>
               <a:t>https://guides.github.com/activities/hello-world/</a:t>
             </a:r>
             <a:r>
-              <a:rPr lang="en-GB" dirty="0"/>
-              <a:t> </a:t>
-            </a:r>
-            <a:endParaRPr lang="en-GB" dirty="0">
-              <a:hlinkClick r:id="rId3"/>
-            </a:endParaRPr>
+              <a:rPr lang="en-US" sz="2650" dirty="0">
+                <a:latin typeface="Arial"/>
+                <a:cs typeface="Arial"/>
+              </a:rPr>
+              <a:t> </a:t>
+            </a:r>
+            <a:endParaRPr lang="en-US"/>
+          </a:p>
+          <a:p>
+            <a:pPr marL="685165" lvl="1" indent="-227965"/>
+            <a:endParaRPr lang="en-US" sz="2650" dirty="0"/>
           </a:p>
         </p:txBody>
       </p:sp>
@@ -3687,6 +3767,96 @@
           <p:cNvPr id="2" name="Title 1">
             <a:extLst>
               <a:ext uri="{FF2B5EF4-FFF2-40B4-BE49-F238E27FC236}">
+                <a16:creationId xmlns:a16="http://schemas.microsoft.com/office/drawing/2014/main" id="{B1CDA7D6-175E-4DDE-AA6E-DFBA4A7B145B}"/>
+              </a:ext>
+            </a:extLst>
+          </p:cNvPr>
+          <p:cNvSpPr>
+            <a:spLocks noGrp="1"/>
+          </p:cNvSpPr>
+          <p:nvPr>
+            <p:ph type="title"/>
+          </p:nvPr>
+        </p:nvSpPr>
+        <p:spPr/>
+        <p:txBody>
+          <a:bodyPr/>
+          <a:lstStyle/>
+          <a:p>
+            <a:r>
+              <a:rPr lang="en-US" sz="4250" dirty="0">
+                <a:latin typeface="Sanchez Regular"/>
+              </a:rPr>
+              <a:t>Any questions?</a:t>
+            </a:r>
+            <a:endParaRPr lang="en-US" dirty="0"/>
+          </a:p>
+        </p:txBody>
+      </p:sp>
+      <p:pic>
+        <p:nvPicPr>
+          <p:cNvPr id="4" name="Picture 4" descr="Icon&#10;&#10;Description automatically generated">
+            <a:extLst>
+              <a:ext uri="{FF2B5EF4-FFF2-40B4-BE49-F238E27FC236}">
+                <a16:creationId xmlns:a16="http://schemas.microsoft.com/office/drawing/2014/main" id="{9D2CAE24-62B4-4234-A742-34E7B37FD74C}"/>
+              </a:ext>
+            </a:extLst>
+          </p:cNvPr>
+          <p:cNvPicPr>
+            <a:picLocks noChangeAspect="1"/>
+          </p:cNvPicPr>
+          <p:nvPr/>
+        </p:nvPicPr>
+        <p:blipFill rotWithShape="1">
+          <a:blip r:embed="rId2"/>
+          <a:srcRect t="-74" r="-330" b="5590"/>
+          <a:stretch/>
+        </p:blipFill>
+        <p:spPr>
+          <a:xfrm>
+            <a:off x="4096085" y="1834816"/>
+            <a:ext cx="4066685" cy="4067495"/>
+          </a:xfrm>
+          <a:prstGeom prst="rect">
+            <a:avLst/>
+          </a:prstGeom>
+        </p:spPr>
+      </p:pic>
+    </p:spTree>
+    <p:extLst>
+      <p:ext uri="{BB962C8B-B14F-4D97-AF65-F5344CB8AC3E}">
+        <p14:creationId xmlns:p14="http://schemas.microsoft.com/office/powerpoint/2010/main" val="39384243"/>
+      </p:ext>
+    </p:extLst>
+  </p:cSld>
+  <p:clrMapOvr>
+    <a:masterClrMapping/>
+  </p:clrMapOvr>
+</p:sld>
+</file>
+
+<file path=ppt/slides/slide19.xml><?xml version="1.0" encoding="utf-8"?>
+<p:sld xmlns:a="http://schemas.openxmlformats.org/drawingml/2006/main" xmlns:r="http://schemas.openxmlformats.org/officeDocument/2006/relationships" xmlns:p="http://schemas.openxmlformats.org/presentationml/2006/main">
+  <p:cSld>
+    <p:spTree>
+      <p:nvGrpSpPr>
+        <p:cNvPr id="1" name=""/>
+        <p:cNvGrpSpPr/>
+        <p:nvPr/>
+      </p:nvGrpSpPr>
+      <p:grpSpPr>
+        <a:xfrm>
+          <a:off x="0" y="0"/>
+          <a:ext cx="0" cy="0"/>
+          <a:chOff x="0" y="0"/>
+          <a:chExt cx="0" cy="0"/>
+        </a:xfrm>
+      </p:grpSpPr>
+      <p:sp>
+        <p:nvSpPr>
+          <p:cNvPr id="2" name="Title 1">
+            <a:extLst>
+              <a:ext uri="{FF2B5EF4-FFF2-40B4-BE49-F238E27FC236}">
                 <a16:creationId xmlns:a16="http://schemas.microsoft.com/office/drawing/2014/main" id="{3BEB2333-4531-4F49-98C7-71CE6B119B78}"/>
               </a:ext>
             </a:extLst>
@@ -3757,14 +3927,135 @@
           <a:p>
             <a:pPr lvl="1"/>
             <a:r>
-              <a:rPr dirty="0">
+              <a:rPr>
                 <a:hlinkClick r:id="rId2"/>
               </a:rPr>
               <a:t>Good script</a:t>
             </a:r>
-            <a:endParaRPr dirty="0">
+            <a:endParaRPr>
               <a:hlinkClick r:id="rId3"/>
             </a:endParaRPr>
+          </a:p>
+        </p:txBody>
+      </p:sp>
+      <p:sp>
+        <p:nvSpPr>
+          <p:cNvPr id="4" name="TextBox 3">
+            <a:extLst>
+              <a:ext uri="{FF2B5EF4-FFF2-40B4-BE49-F238E27FC236}">
+                <a16:creationId xmlns:a16="http://schemas.microsoft.com/office/drawing/2014/main" id="{5EC9ABBD-13C6-47C0-82ED-CAC810205DE8}"/>
+              </a:ext>
+            </a:extLst>
+          </p:cNvPr>
+          <p:cNvSpPr txBox="1"/>
+          <p:nvPr/>
+        </p:nvSpPr>
+        <p:spPr>
+          <a:xfrm>
+            <a:off x="829340" y="3627372"/>
+            <a:ext cx="10558130" cy="2400657"/>
+          </a:xfrm>
+          <a:prstGeom prst="rect">
+            <a:avLst/>
+          </a:prstGeom>
+          <a:noFill/>
+        </p:spPr>
+        <p:txBody>
+          <a:bodyPr wrap="square" rtlCol="0">
+            <a:spAutoFit/>
+          </a:bodyPr>
+          <a:lstStyle/>
+          <a:p>
+            <a:r>
+              <a:rPr lang="en-GB" sz="2200" dirty="0"/>
+              <a:t>Things to consider for the bad script: </a:t>
+            </a:r>
+          </a:p>
+          <a:p>
+            <a:endParaRPr lang="en-GB" sz="2200" dirty="0"/>
+          </a:p>
+          <a:p>
+            <a:pPr marL="342900" lvl="0" indent="-342900">
+              <a:buFont typeface="+mj-lt"/>
+              <a:buAutoNum type="alphaLcPeriod"/>
+              <a:tabLst>
+                <a:tab pos="457200" algn="l"/>
+              </a:tabLst>
+            </a:pPr>
+            <a:r>
+              <a:rPr lang="en-GB" sz="2200" dirty="0">
+                <a:effectLst/>
+                <a:ea typeface="Times New Roman" panose="02020603050405020304" pitchFamily="18" charset="0"/>
+              </a:rPr>
+              <a:t>What is the point of this script?</a:t>
+            </a:r>
+            <a:endParaRPr lang="en-GB" sz="2200" dirty="0">
+              <a:effectLst/>
+              <a:ea typeface="Calibri" panose="020F0502020204030204" pitchFamily="34" charset="0"/>
+            </a:endParaRPr>
+          </a:p>
+          <a:p>
+            <a:pPr marL="342900" lvl="0" indent="-342900">
+              <a:buFont typeface="+mj-lt"/>
+              <a:buAutoNum type="alphaLcPeriod"/>
+              <a:tabLst>
+                <a:tab pos="457200" algn="l"/>
+              </a:tabLst>
+            </a:pPr>
+            <a:r>
+              <a:rPr lang="en-GB" sz="2200" dirty="0">
+                <a:effectLst/>
+                <a:ea typeface="Times New Roman" panose="02020603050405020304" pitchFamily="18" charset="0"/>
+              </a:rPr>
+              <a:t>What is it about? Can you tell by the commands? Could you infer, if you had to? </a:t>
+            </a:r>
+            <a:endParaRPr lang="en-GB" sz="2200" dirty="0">
+              <a:effectLst/>
+              <a:ea typeface="Calibri" panose="020F0502020204030204" pitchFamily="34" charset="0"/>
+            </a:endParaRPr>
+          </a:p>
+          <a:p>
+            <a:pPr marL="342900" lvl="0" indent="-342900">
+              <a:buFont typeface="+mj-lt"/>
+              <a:buAutoNum type="alphaLcPeriod"/>
+              <a:tabLst>
+                <a:tab pos="457200" algn="l"/>
+              </a:tabLst>
+            </a:pPr>
+            <a:r>
+              <a:rPr lang="en-GB" sz="2200" dirty="0">
+                <a:effectLst/>
+                <a:ea typeface="Times New Roman" panose="02020603050405020304" pitchFamily="18" charset="0"/>
+              </a:rPr>
+              <a:t>How could you make this script better? </a:t>
+            </a:r>
+            <a:endParaRPr lang="en-GB" sz="2200" dirty="0">
+              <a:effectLst/>
+              <a:ea typeface="Calibri" panose="020F0502020204030204" pitchFamily="34" charset="0"/>
+            </a:endParaRPr>
+          </a:p>
+          <a:p>
+            <a:pPr marL="342900" lvl="0" indent="-342900">
+              <a:buFont typeface="+mj-lt"/>
+              <a:buAutoNum type="alphaLcPeriod"/>
+              <a:tabLst>
+                <a:tab pos="457200" algn="l"/>
+              </a:tabLst>
+            </a:pPr>
+            <a:r>
+              <a:rPr lang="en-GB" sz="2200" dirty="0">
+                <a:effectLst/>
+                <a:ea typeface="Times New Roman" panose="02020603050405020304" pitchFamily="18" charset="0"/>
+              </a:rPr>
+              <a:t>Is this something you could share with a new user/researcher/analyst? </a:t>
+            </a:r>
+            <a:endParaRPr lang="en-GB" sz="2200" dirty="0">
+              <a:effectLst/>
+              <a:ea typeface="Calibri" panose="020F0502020204030204" pitchFamily="34" charset="0"/>
+            </a:endParaRPr>
+          </a:p>
+          <a:p>
+            <a:endParaRPr lang="en-GB" dirty="0"/>
           </a:p>
         </p:txBody>
       </p:sp>
@@ -3851,36 +4142,42 @@
           <a:p>
             <a:pPr lvl="1"/>
             <a:r>
+              <a:rPr dirty="0"/>
               <a:t>Making a new R script</a:t>
             </a:r>
           </a:p>
           <a:p>
             <a:pPr lvl="1"/>
             <a:r>
+              <a:rPr dirty="0"/>
               <a:t>Commenting your scripts</a:t>
             </a:r>
           </a:p>
           <a:p>
             <a:pPr lvl="1"/>
             <a:r>
+              <a:rPr dirty="0"/>
               <a:t>What to think about before starting to script</a:t>
             </a:r>
           </a:p>
           <a:p>
             <a:pPr lvl="1"/>
             <a:r>
+              <a:rPr dirty="0"/>
               <a:t>How the top of your script should look</a:t>
             </a:r>
           </a:p>
           <a:p>
             <a:pPr lvl="1"/>
             <a:r>
+              <a:rPr dirty="0"/>
               <a:t>Making your code easier to read</a:t>
             </a:r>
           </a:p>
           <a:p>
             <a:pPr lvl="1"/>
             <a:r>
+              <a:rPr dirty="0"/>
               <a:t>Saving your scripts</a:t>
             </a:r>
           </a:p>
@@ -3969,36 +4266,54 @@
           <a:p>
             <a:pPr lvl="1"/>
             <a:r>
+              <a:rPr dirty="0"/>
               <a:t>The usual R Studio screen has four windows:</a:t>
             </a:r>
           </a:p>
           <a:p>
             <a:pPr lvl="2"/>
             <a:r>
+              <a:rPr dirty="0"/>
               <a:t>CONSOLE</a:t>
             </a:r>
           </a:p>
           <a:p>
             <a:pPr lvl="2"/>
             <a:r>
-              <a:t>WORKPLCE AND HISTORY</a:t>
+              <a:rPr dirty="0"/>
+              <a:t>WORKPL</a:t>
+            </a:r>
+            <a:r>
+              <a:rPr lang="en-US" dirty="0"/>
+              <a:t>A</a:t>
+            </a:r>
+            <a:r>
+              <a:rPr dirty="0"/>
+              <a:t>CE AND HISTORY</a:t>
             </a:r>
           </a:p>
           <a:p>
             <a:pPr lvl="2"/>
             <a:r>
+              <a:rPr dirty="0"/>
               <a:t>FILES, PLOTS, PACKAGES AND HELP</a:t>
             </a:r>
           </a:p>
           <a:p>
             <a:pPr lvl="2"/>
             <a:r>
-              <a:rPr b="1"/>
+              <a:rPr b="1" dirty="0"/>
               <a:t>R SCRIPT AND DATA VIEW</a:t>
             </a:r>
             <a:r>
-              <a:t> (this is where you keep a record of your work. For Stata users, this would be like your do-file, for SPSS users it is like the syntax and for SAS users, the SAS program.</a:t>
-            </a:r>
+              <a:rPr dirty="0"/>
+              <a:t> (this is where you keep a record of your work. For Stata users, this would be like your do-file, for SPSS users it is like the syntax and for SAS users, the SAS program</a:t>
+            </a:r>
+            <a:r>
+              <a:rPr lang="en-US" dirty="0"/>
+              <a:t>)</a:t>
+            </a:r>
+            <a:endParaRPr dirty="0"/>
           </a:p>
         </p:txBody>
       </p:sp>
@@ -4493,31 +4808,57 @@
         </p:nvSpPr>
         <p:spPr/>
         <p:txBody>
-          <a:bodyPr/>
+          <a:bodyPr vert="horz" lIns="91440" tIns="45720" rIns="91440" bIns="45720" rtlCol="0" anchor="t">
+            <a:normAutofit/>
+          </a:bodyPr>
           <a:lstStyle/>
           <a:p>
-            <a:pPr lvl="1"/>
-            <a:r>
-              <a:rPr dirty="0"/>
+            <a:pPr marL="685165" lvl="1" indent="-227965"/>
+            <a:r>
+              <a:rPr sz="2650" dirty="0">
+                <a:latin typeface="Arial"/>
+                <a:cs typeface="Arial"/>
+              </a:rPr>
               <a:t>Code with a # before it does not get run</a:t>
             </a:r>
-          </a:p>
-          <a:p>
-            <a:pPr lvl="1"/>
-            <a:r>
-              <a:rPr dirty="0"/>
+            <a:endParaRPr lang="en-US" sz="2650" dirty="0">
+              <a:latin typeface="Arial"/>
+              <a:cs typeface="Arial"/>
+            </a:endParaRPr>
+          </a:p>
+          <a:p>
+            <a:pPr marL="685165" lvl="1" indent="-227965"/>
+            <a:r>
+              <a:rPr sz="2650" dirty="0">
+                <a:latin typeface="Arial"/>
+                <a:cs typeface="Arial"/>
+              </a:rPr>
               <a:t>This is useful for making your scripts much easier to read!</a:t>
             </a:r>
           </a:p>
           <a:p>
-            <a:pPr lvl="1"/>
-            <a:r>
-              <a:rPr dirty="0"/>
-              <a:t>Comment on WHY and WHAT (to start with)</a:t>
-            </a:r>
-          </a:p>
-          <a:p>
-            <a:pPr lvl="2"/>
+            <a:pPr marL="685165" lvl="1" indent="-227965"/>
+            <a:r>
+              <a:rPr sz="2650" dirty="0">
+                <a:latin typeface="Arial"/>
+                <a:cs typeface="Arial"/>
+              </a:rPr>
+              <a:t>Comment on WHY and WHAT (to start with</a:t>
+            </a:r>
+            <a:r>
+              <a:rPr lang="en-US" sz="2650" dirty="0">
+                <a:latin typeface="Arial"/>
+                <a:cs typeface="Arial"/>
+              </a:rPr>
+              <a:t>)</a:t>
+            </a:r>
+            <a:endParaRPr sz="2650" dirty="0">
+              <a:latin typeface="Arial"/>
+              <a:cs typeface="Arial"/>
+            </a:endParaRPr>
+          </a:p>
+          <a:p>
+            <a:pPr marL="1142365" lvl="2" indent="-227965"/>
             <a:r>
               <a:rPr dirty="0"/>
               <a:t>Start with many comments! Also, use comments to split up the script to make it clearer</a:t>
@@ -5016,4 +5357,234 @@
     </a:ext>
   </a:extLst>
 </a:theme>
+</file>
+
+<file path=customXml/item1.xml><?xml version="1.0" encoding="utf-8"?>
+<p:properties xmlns:p="http://schemas.microsoft.com/office/2006/metadata/properties" xmlns:xsi="http://www.w3.org/2001/XMLSchema-instance" xmlns:pc="http://schemas.microsoft.com/office/infopath/2007/PartnerControls">
+  <documentManagement/>
+</p:properties>
+</file>
+
+<file path=customXml/item2.xml><?xml version="1.0" encoding="utf-8"?>
+<?mso-contentType ?>
+<FormTemplates xmlns="http://schemas.microsoft.com/sharepoint/v3/contenttype/forms">
+  <Display>DocumentLibraryForm</Display>
+  <Edit>DocumentLibraryForm</Edit>
+  <New>DocumentLibraryForm</New>
+</FormTemplates>
+</file>
+
+<file path=customXml/item3.xml><?xml version="1.0" encoding="utf-8"?>
+<ct:contentTypeSchema xmlns:ct="http://schemas.microsoft.com/office/2006/metadata/contentType" xmlns:ma="http://schemas.microsoft.com/office/2006/metadata/properties/metaAttributes" ct:_="" ma:_="" ma:contentTypeName="Document" ma:contentTypeID="0x010100097ED8B544477E469D3ABAA4FBABB3E0" ma:contentTypeVersion="6" ma:contentTypeDescription="Create a new document." ma:contentTypeScope="" ma:versionID="966e9042a1c71da30f2cec89847d81cc">
+  <xsd:schema xmlns:xsd="http://www.w3.org/2001/XMLSchema" xmlns:xs="http://www.w3.org/2001/XMLSchema" xmlns:p="http://schemas.microsoft.com/office/2006/metadata/properties" xmlns:ns2="c0912065-6985-4f02-9b2c-886a2cb5a84e" xmlns:ns3="6f9e31c9-6011-4a8a-99d3-586f18030a45" targetNamespace="http://schemas.microsoft.com/office/2006/metadata/properties" ma:root="true" ma:fieldsID="232245aa43c24c5c52c84518df58f82e" ns2:_="" ns3:_="">
+    <xsd:import namespace="c0912065-6985-4f02-9b2c-886a2cb5a84e"/>
+    <xsd:import namespace="6f9e31c9-6011-4a8a-99d3-586f18030a45"/>
+    <xsd:element name="properties">
+      <xsd:complexType>
+        <xsd:sequence>
+          <xsd:element name="documentManagement">
+            <xsd:complexType>
+              <xsd:all>
+                <xsd:element ref="ns2:MediaServiceMetadata" minOccurs="0"/>
+                <xsd:element ref="ns2:MediaServiceFastMetadata" minOccurs="0"/>
+                <xsd:element ref="ns3:SharedWithUsers" minOccurs="0"/>
+                <xsd:element ref="ns3:SharedWithDetails" minOccurs="0"/>
+                <xsd:element ref="ns2:MediaServiceAutoKeyPoints" minOccurs="0"/>
+                <xsd:element ref="ns2:MediaServiceKeyPoints" minOccurs="0"/>
+              </xsd:all>
+            </xsd:complexType>
+          </xsd:element>
+        </xsd:sequence>
+      </xsd:complexType>
+    </xsd:element>
+  </xsd:schema>
+  <xsd:schema xmlns:xsd="http://www.w3.org/2001/XMLSchema" xmlns:xs="http://www.w3.org/2001/XMLSchema" xmlns:dms="http://schemas.microsoft.com/office/2006/documentManagement/types" xmlns:pc="http://schemas.microsoft.com/office/infopath/2007/PartnerControls" targetNamespace="c0912065-6985-4f02-9b2c-886a2cb5a84e" elementFormDefault="qualified">
+    <xsd:import namespace="http://schemas.microsoft.com/office/2006/documentManagement/types"/>
+    <xsd:import namespace="http://schemas.microsoft.com/office/infopath/2007/PartnerControls"/>
+    <xsd:element name="MediaServiceMetadata" ma:index="8" nillable="true" ma:displayName="MediaServiceMetadata" ma:hidden="true" ma:internalName="MediaServiceMetadata" ma:readOnly="true">
+      <xsd:simpleType>
+        <xsd:restriction base="dms:Note"/>
+      </xsd:simpleType>
+    </xsd:element>
+    <xsd:element name="MediaServiceFastMetadata" ma:index="9" nillable="true" ma:displayName="MediaServiceFastMetadata" ma:hidden="true" ma:internalName="MediaServiceFastMetadata" ma:readOnly="true">
+      <xsd:simpleType>
+        <xsd:restriction base="dms:Note"/>
+      </xsd:simpleType>
+    </xsd:element>
+    <xsd:element name="MediaServiceAutoKeyPoints" ma:index="12" nillable="true" ma:displayName="MediaServiceAutoKeyPoints" ma:hidden="true" ma:internalName="MediaServiceAutoKeyPoints" ma:readOnly="true">
+      <xsd:simpleType>
+        <xsd:restriction base="dms:Note"/>
+      </xsd:simpleType>
+    </xsd:element>
+    <xsd:element name="MediaServiceKeyPoints" ma:index="13" nillable="true" ma:displayName="KeyPoints" ma:internalName="MediaServiceKeyPoints" ma:readOnly="true">
+      <xsd:simpleType>
+        <xsd:restriction base="dms:Note">
+          <xsd:maxLength value="255"/>
+        </xsd:restriction>
+      </xsd:simpleType>
+    </xsd:element>
+  </xsd:schema>
+  <xsd:schema xmlns:xsd="http://www.w3.org/2001/XMLSchema" xmlns:xs="http://www.w3.org/2001/XMLSchema" xmlns:dms="http://schemas.microsoft.com/office/2006/documentManagement/types" xmlns:pc="http://schemas.microsoft.com/office/infopath/2007/PartnerControls" targetNamespace="6f9e31c9-6011-4a8a-99d3-586f18030a45" elementFormDefault="qualified">
+    <xsd:import namespace="http://schemas.microsoft.com/office/2006/documentManagement/types"/>
+    <xsd:import namespace="http://schemas.microsoft.com/office/infopath/2007/PartnerControls"/>
+    <xsd:element name="SharedWithUsers" ma:index="10" nillable="true" ma:displayName="Shared With" ma:internalName="SharedWithUsers" ma:readOnly="true">
+      <xsd:complexType>
+        <xsd:complexContent>
+          <xsd:extension base="dms:UserMulti">
+            <xsd:sequence>
+              <xsd:element name="UserInfo" minOccurs="0" maxOccurs="unbounded">
+                <xsd:complexType>
+                  <xsd:sequence>
+                    <xsd:element name="DisplayName" type="xsd:string" minOccurs="0"/>
+                    <xsd:element name="AccountId" type="dms:UserId" minOccurs="0" nillable="true"/>
+                    <xsd:element name="AccountType" type="xsd:string" minOccurs="0"/>
+                  </xsd:sequence>
+                </xsd:complexType>
+              </xsd:element>
+            </xsd:sequence>
+          </xsd:extension>
+        </xsd:complexContent>
+      </xsd:complexType>
+    </xsd:element>
+    <xsd:element name="SharedWithDetails" ma:index="11" nillable="true" ma:displayName="Shared With Details" ma:internalName="SharedWithDetails" ma:readOnly="true">
+      <xsd:simpleType>
+        <xsd:restriction base="dms:Note">
+          <xsd:maxLength value="255"/>
+        </xsd:restriction>
+      </xsd:simpleType>
+    </xsd:element>
+  </xsd:schema>
+  <xsd:schema xmlns="http://schemas.openxmlformats.org/package/2006/metadata/core-properties" xmlns:xsd="http://www.w3.org/2001/XMLSchema" xmlns:xsi="http://www.w3.org/2001/XMLSchema-instance" xmlns:dc="http://purl.org/dc/elements/1.1/" xmlns:dcterms="http://purl.org/dc/terms/" xmlns:odoc="http://schemas.microsoft.com/internal/obd" targetNamespace="http://schemas.openxmlformats.org/package/2006/metadata/core-properties" elementFormDefault="qualified" attributeFormDefault="unqualified" blockDefault="#all">
+    <xsd:import namespace="http://purl.org/dc/elements/1.1/" schemaLocation="http://dublincore.org/schemas/xmls/qdc/2003/04/02/dc.xsd"/>
+    <xsd:import namespace="http://purl.org/dc/terms/" schemaLocation="http://dublincore.org/schemas/xmls/qdc/2003/04/02/dcterms.xsd"/>
+    <xsd:element name="coreProperties" type="CT_coreProperties"/>
+    <xsd:complexType name="CT_coreProperties">
+      <xsd:all>
+        <xsd:element ref="dc:creator" minOccurs="0" maxOccurs="1"/>
+        <xsd:element ref="dcterms:created" minOccurs="0" maxOccurs="1"/>
+        <xsd:element ref="dc:identifier" minOccurs="0" maxOccurs="1"/>
+        <xsd:element name="contentType" minOccurs="0" maxOccurs="1" type="xsd:string" ma:index="0" ma:displayName="Content Type"/>
+        <xsd:element ref="dc:title" minOccurs="0" maxOccurs="1" ma:index="4" ma:displayName="Title"/>
+        <xsd:element ref="dc:subject" minOccurs="0" maxOccurs="1"/>
+        <xsd:element ref="dc:description" minOccurs="0" maxOccurs="1"/>
+        <xsd:element name="keywords" minOccurs="0" maxOccurs="1" type="xsd:string"/>
+        <xsd:element ref="dc:language" minOccurs="0" maxOccurs="1"/>
+        <xsd:element name="category" minOccurs="0" maxOccurs="1" type="xsd:string"/>
+        <xsd:element name="version" minOccurs="0" maxOccurs="1" type="xsd:string"/>
+        <xsd:element name="revision" minOccurs="0" maxOccurs="1" type="xsd:string">
+          <xsd:annotation>
+            <xsd:documentation>
+                        This value indicates the number of saves or revisions. The application is responsible for updating this value after each revision.
+                    </xsd:documentation>
+          </xsd:annotation>
+        </xsd:element>
+        <xsd:element name="lastModifiedBy" minOccurs="0" maxOccurs="1" type="xsd:string"/>
+        <xsd:element ref="dcterms:modified" minOccurs="0" maxOccurs="1"/>
+        <xsd:element name="contentStatus" minOccurs="0" maxOccurs="1" type="xsd:string"/>
+      </xsd:all>
+    </xsd:complexType>
+  </xsd:schema>
+  <xs:schema xmlns:pc="http://schemas.microsoft.com/office/infopath/2007/PartnerControls" xmlns:xs="http://www.w3.org/2001/XMLSchema" targetNamespace="http://schemas.microsoft.com/office/infopath/2007/PartnerControls" elementFormDefault="qualified" attributeFormDefault="unqualified">
+    <xs:element name="Person">
+      <xs:complexType>
+        <xs:sequence>
+          <xs:element ref="pc:DisplayName" minOccurs="0"/>
+          <xs:element ref="pc:AccountId" minOccurs="0"/>
+          <xs:element ref="pc:AccountType" minOccurs="0"/>
+        </xs:sequence>
+      </xs:complexType>
+    </xs:element>
+    <xs:element name="DisplayName" type="xs:string"/>
+    <xs:element name="AccountId" type="xs:string"/>
+    <xs:element name="AccountType" type="xs:string"/>
+    <xs:element name="BDCAssociatedEntity">
+      <xs:complexType>
+        <xs:sequence>
+          <xs:element ref="pc:BDCEntity" minOccurs="0" maxOccurs="unbounded"/>
+        </xs:sequence>
+        <xs:attribute ref="pc:EntityNamespace"/>
+        <xs:attribute ref="pc:EntityName"/>
+        <xs:attribute ref="pc:SystemInstanceName"/>
+        <xs:attribute ref="pc:AssociationName"/>
+      </xs:complexType>
+    </xs:element>
+    <xs:attribute name="EntityNamespace" type="xs:string"/>
+    <xs:attribute name="EntityName" type="xs:string"/>
+    <xs:attribute name="SystemInstanceName" type="xs:string"/>
+    <xs:attribute name="AssociationName" type="xs:string"/>
+    <xs:element name="BDCEntity">
+      <xs:complexType>
+        <xs:sequence>
+          <xs:element ref="pc:EntityDisplayName" minOccurs="0"/>
+          <xs:element ref="pc:EntityInstanceReference" minOccurs="0"/>
+          <xs:element ref="pc:EntityId1" minOccurs="0"/>
+          <xs:element ref="pc:EntityId2" minOccurs="0"/>
+          <xs:element ref="pc:EntityId3" minOccurs="0"/>
+          <xs:element ref="pc:EntityId4" minOccurs="0"/>
+          <xs:element ref="pc:EntityId5" minOccurs="0"/>
+        </xs:sequence>
+      </xs:complexType>
+    </xs:element>
+    <xs:element name="EntityDisplayName" type="xs:string"/>
+    <xs:element name="EntityInstanceReference" type="xs:string"/>
+    <xs:element name="EntityId1" type="xs:string"/>
+    <xs:element name="EntityId2" type="xs:string"/>
+    <xs:element name="EntityId3" type="xs:string"/>
+    <xs:element name="EntityId4" type="xs:string"/>
+    <xs:element name="EntityId5" type="xs:string"/>
+    <xs:element name="Terms">
+      <xs:complexType>
+        <xs:sequence>
+          <xs:element ref="pc:TermInfo" minOccurs="0" maxOccurs="unbounded"/>
+        </xs:sequence>
+      </xs:complexType>
+    </xs:element>
+    <xs:element name="TermInfo">
+      <xs:complexType>
+        <xs:sequence>
+          <xs:element ref="pc:TermName" minOccurs="0"/>
+          <xs:element ref="pc:TermId" minOccurs="0"/>
+        </xs:sequence>
+      </xs:complexType>
+    </xs:element>
+    <xs:element name="TermName" type="xs:string"/>
+    <xs:element name="TermId" type="xs:string"/>
+  </xs:schema>
+</ct:contentTypeSchema>
+</file>
+
+<file path=customXml/itemProps1.xml><?xml version="1.0" encoding="utf-8"?>
+<ds:datastoreItem xmlns:ds="http://schemas.openxmlformats.org/officeDocument/2006/customXml" ds:itemID="{0D91041C-A66B-4F93-A65A-FC682848C8D1}">
+  <ds:schemaRefs>
+    <ds:schemaRef ds:uri="http://schemas.microsoft.com/office/2006/metadata/properties"/>
+    <ds:schemaRef ds:uri="http://schemas.microsoft.com/office/infopath/2007/PartnerControls"/>
+  </ds:schemaRefs>
+</ds:datastoreItem>
+</file>
+
+<file path=customXml/itemProps2.xml><?xml version="1.0" encoding="utf-8"?>
+<ds:datastoreItem xmlns:ds="http://schemas.openxmlformats.org/officeDocument/2006/customXml" ds:itemID="{8AB02FDC-91DD-4B3B-9943-065D38A8CAF1}">
+  <ds:schemaRefs>
+    <ds:schemaRef ds:uri="http://schemas.microsoft.com/sharepoint/v3/contenttype/forms"/>
+  </ds:schemaRefs>
+</ds:datastoreItem>
+</file>
+
+<file path=customXml/itemProps3.xml><?xml version="1.0" encoding="utf-8"?>
+<ds:datastoreItem xmlns:ds="http://schemas.openxmlformats.org/officeDocument/2006/customXml" ds:itemID="{7DC883E6-8997-4707-8117-CB3AADB8DDCF}">
+  <ds:schemaRefs>
+    <ds:schemaRef ds:uri="http://schemas.microsoft.com/office/2006/metadata/contentType"/>
+    <ds:schemaRef ds:uri="http://schemas.microsoft.com/office/2006/metadata/properties/metaAttributes"/>
+    <ds:schemaRef ds:uri="http://www.w3.org/2001/XMLSchema"/>
+    <ds:schemaRef ds:uri="http://schemas.microsoft.com/office/2006/metadata/properties"/>
+    <ds:schemaRef ds:uri="c0912065-6985-4f02-9b2c-886a2cb5a84e"/>
+    <ds:schemaRef ds:uri="6f9e31c9-6011-4a8a-99d3-586f18030a45"/>
+    <ds:schemaRef ds:uri="http://schemas.microsoft.com/office/2006/documentManagement/types"/>
+    <ds:schemaRef ds:uri="http://schemas.microsoft.com/office/infopath/2007/PartnerControls"/>
+    <ds:schemaRef ds:uri="http://schemas.openxmlformats.org/package/2006/metadata/core-properties"/>
+    <ds:schemaRef ds:uri="http://purl.org/dc/elements/1.1/"/>
+    <ds:schemaRef ds:uri="http://purl.org/dc/terms/"/>
+    <ds:schemaRef ds:uri="http://schemas.microsoft.com/internal/obd"/>
+  </ds:schemaRefs>
+</ds:datastoreItem>
 </file>
</xml_diff>